<commit_message>
week6 nosqli 5/5 + LT
</commit_message>
<xml_diff>
--- a/week3.2.file_upload/file_upload.pptx
+++ b/week3.2.file_upload/file_upload.pptx
@@ -264,7 +264,7 @@
           <a:p>
             <a:fld id="{B2ACCAD5-56B7-4C78-BE2A-F101EAB16DBD}" type="datetimeFigureOut">
               <a:rPr lang="en-US" smtClean="0"/>
-              <a:t>15/06/2025</a:t>
+              <a:t>19/06/2025</a:t>
             </a:fld>
             <a:endParaRPr lang="en-US"/>
           </a:p>
@@ -434,7 +434,7 @@
           <a:p>
             <a:fld id="{B2ACCAD5-56B7-4C78-BE2A-F101EAB16DBD}" type="datetimeFigureOut">
               <a:rPr lang="en-US" smtClean="0"/>
-              <a:t>15/06/2025</a:t>
+              <a:t>19/06/2025</a:t>
             </a:fld>
             <a:endParaRPr lang="en-US"/>
           </a:p>
@@ -614,7 +614,7 @@
           <a:p>
             <a:fld id="{B2ACCAD5-56B7-4C78-BE2A-F101EAB16DBD}" type="datetimeFigureOut">
               <a:rPr lang="en-US" smtClean="0"/>
-              <a:t>15/06/2025</a:t>
+              <a:t>19/06/2025</a:t>
             </a:fld>
             <a:endParaRPr lang="en-US"/>
           </a:p>
@@ -784,7 +784,7 @@
           <a:p>
             <a:fld id="{B2ACCAD5-56B7-4C78-BE2A-F101EAB16DBD}" type="datetimeFigureOut">
               <a:rPr lang="en-US" smtClean="0"/>
-              <a:t>15/06/2025</a:t>
+              <a:t>19/06/2025</a:t>
             </a:fld>
             <a:endParaRPr lang="en-US"/>
           </a:p>
@@ -1030,7 +1030,7 @@
           <a:p>
             <a:fld id="{B2ACCAD5-56B7-4C78-BE2A-F101EAB16DBD}" type="datetimeFigureOut">
               <a:rPr lang="en-US" smtClean="0"/>
-              <a:t>15/06/2025</a:t>
+              <a:t>19/06/2025</a:t>
             </a:fld>
             <a:endParaRPr lang="en-US"/>
           </a:p>
@@ -1262,7 +1262,7 @@
           <a:p>
             <a:fld id="{B2ACCAD5-56B7-4C78-BE2A-F101EAB16DBD}" type="datetimeFigureOut">
               <a:rPr lang="en-US" smtClean="0"/>
-              <a:t>15/06/2025</a:t>
+              <a:t>19/06/2025</a:t>
             </a:fld>
             <a:endParaRPr lang="en-US"/>
           </a:p>
@@ -1629,7 +1629,7 @@
           <a:p>
             <a:fld id="{B2ACCAD5-56B7-4C78-BE2A-F101EAB16DBD}" type="datetimeFigureOut">
               <a:rPr lang="en-US" smtClean="0"/>
-              <a:t>15/06/2025</a:t>
+              <a:t>19/06/2025</a:t>
             </a:fld>
             <a:endParaRPr lang="en-US"/>
           </a:p>
@@ -1747,7 +1747,7 @@
           <a:p>
             <a:fld id="{B2ACCAD5-56B7-4C78-BE2A-F101EAB16DBD}" type="datetimeFigureOut">
               <a:rPr lang="en-US" smtClean="0"/>
-              <a:t>15/06/2025</a:t>
+              <a:t>19/06/2025</a:t>
             </a:fld>
             <a:endParaRPr lang="en-US"/>
           </a:p>
@@ -1842,7 +1842,7 @@
           <a:p>
             <a:fld id="{B2ACCAD5-56B7-4C78-BE2A-F101EAB16DBD}" type="datetimeFigureOut">
               <a:rPr lang="en-US" smtClean="0"/>
-              <a:t>15/06/2025</a:t>
+              <a:t>19/06/2025</a:t>
             </a:fld>
             <a:endParaRPr lang="en-US"/>
           </a:p>
@@ -2119,7 +2119,7 @@
           <a:p>
             <a:fld id="{B2ACCAD5-56B7-4C78-BE2A-F101EAB16DBD}" type="datetimeFigureOut">
               <a:rPr lang="en-US" smtClean="0"/>
-              <a:t>15/06/2025</a:t>
+              <a:t>19/06/2025</a:t>
             </a:fld>
             <a:endParaRPr lang="en-US"/>
           </a:p>
@@ -2372,7 +2372,7 @@
           <a:p>
             <a:fld id="{B2ACCAD5-56B7-4C78-BE2A-F101EAB16DBD}" type="datetimeFigureOut">
               <a:rPr lang="en-US" smtClean="0"/>
-              <a:t>15/06/2025</a:t>
+              <a:t>19/06/2025</a:t>
             </a:fld>
             <a:endParaRPr lang="en-US"/>
           </a:p>
@@ -2585,7 +2585,7 @@
           <a:p>
             <a:fld id="{B2ACCAD5-56B7-4C78-BE2A-F101EAB16DBD}" type="datetimeFigureOut">
               <a:rPr lang="en-US" smtClean="0"/>
-              <a:t>15/06/2025</a:t>
+              <a:t>19/06/2025</a:t>
             </a:fld>
             <a:endParaRPr lang="en-US"/>
           </a:p>
@@ -6153,12 +6153,12 @@
               <a:t> </a:t>
             </a:r>
             <a:r>
-              <a:rPr lang="en-US" sz="2800" dirty="0" err="1" smtClean="0"/>
-              <a:t>Commnet</a:t>
-            </a:r>
-            <a:r>
               <a:rPr lang="en-US" sz="2800" dirty="0" smtClean="0"/>
-              <a:t> field, </a:t>
+              <a:t>Comment </a:t>
+            </a:r>
+            <a:r>
+              <a:rPr lang="en-US" sz="2800" dirty="0" smtClean="0"/>
+              <a:t>field, </a:t>
             </a:r>
             <a:r>
               <a:rPr lang="en-US" sz="2800" dirty="0" err="1" smtClean="0"/>
@@ -9022,7 +9022,6 @@
               <a:rPr lang="en-US" dirty="0" smtClean="0"/>
               <a:t>,… </a:t>
             </a:r>
-            <a:endParaRPr lang="en-US" dirty="0" smtClean="0"/>
           </a:p>
           <a:p>
             <a:pPr>
@@ -9169,7 +9168,6 @@
               <a:rPr lang="en-US" dirty="0" smtClean="0"/>
               <a:t> upload file</a:t>
             </a:r>
-            <a:endParaRPr lang="en-US" dirty="0" smtClean="0"/>
           </a:p>
         </p:txBody>
       </p:sp>

</xml_diff>